<commit_message>
add custom extension into shape/picture
</commit_message>
<xml_diff>
--- a/tag-openxml.cui/Blank.pptx
+++ b/tag-openxml.cui/Blank.pptx
@@ -104,6 +104,11 @@
       </a:defRPr>
     </a:lvl9pPr>
   </p:defaultTextStyle>
+  <p:extLst>
+    <p:ext uri="{EFAFB233-063F-42B5-8137-9DF3F51BA10A}">
+      <p15:sldGuideLst xmlns:p15="http://schemas.microsoft.com/office/powerpoint/2012/main"/>
+    </p:ext>
+  </p:extLst>
 </p:presentation>
 </file>
 
@@ -254,7 +259,7 @@
           <a:p>
             <a:fld id="{F828D3D6-F492-446D-8F93-44886E91171F}" type="datetimeFigureOut">
               <a:rPr lang="en-US" smtClean="0"/>
-              <a:t>4/11/2022</a:t>
+              <a:t>2/20/23</a:t>
             </a:fld>
             <a:endParaRPr lang="en-US"/>
           </a:p>
@@ -452,7 +457,7 @@
           <a:p>
             <a:fld id="{F828D3D6-F492-446D-8F93-44886E91171F}" type="datetimeFigureOut">
               <a:rPr lang="en-US" smtClean="0"/>
-              <a:t>4/11/2022</a:t>
+              <a:t>2/20/23</a:t>
             </a:fld>
             <a:endParaRPr lang="en-US"/>
           </a:p>
@@ -660,7 +665,7 @@
           <a:p>
             <a:fld id="{F828D3D6-F492-446D-8F93-44886E91171F}" type="datetimeFigureOut">
               <a:rPr lang="en-US" smtClean="0"/>
-              <a:t>4/11/2022</a:t>
+              <a:t>2/20/23</a:t>
             </a:fld>
             <a:endParaRPr lang="en-US"/>
           </a:p>
@@ -858,7 +863,7 @@
           <a:p>
             <a:fld id="{F828D3D6-F492-446D-8F93-44886E91171F}" type="datetimeFigureOut">
               <a:rPr lang="en-US" smtClean="0"/>
-              <a:t>4/11/2022</a:t>
+              <a:t>2/20/23</a:t>
             </a:fld>
             <a:endParaRPr lang="en-US"/>
           </a:p>
@@ -1133,7 +1138,7 @@
           <a:p>
             <a:fld id="{F828D3D6-F492-446D-8F93-44886E91171F}" type="datetimeFigureOut">
               <a:rPr lang="en-US" smtClean="0"/>
-              <a:t>4/11/2022</a:t>
+              <a:t>2/20/23</a:t>
             </a:fld>
             <a:endParaRPr lang="en-US"/>
           </a:p>
@@ -1398,7 +1403,7 @@
           <a:p>
             <a:fld id="{F828D3D6-F492-446D-8F93-44886E91171F}" type="datetimeFigureOut">
               <a:rPr lang="en-US" smtClean="0"/>
-              <a:t>4/11/2022</a:t>
+              <a:t>2/20/23</a:t>
             </a:fld>
             <a:endParaRPr lang="en-US"/>
           </a:p>
@@ -1810,7 +1815,7 @@
           <a:p>
             <a:fld id="{F828D3D6-F492-446D-8F93-44886E91171F}" type="datetimeFigureOut">
               <a:rPr lang="en-US" smtClean="0"/>
-              <a:t>4/11/2022</a:t>
+              <a:t>2/20/23</a:t>
             </a:fld>
             <a:endParaRPr lang="en-US"/>
           </a:p>
@@ -1951,7 +1956,7 @@
           <a:p>
             <a:fld id="{F828D3D6-F492-446D-8F93-44886E91171F}" type="datetimeFigureOut">
               <a:rPr lang="en-US" smtClean="0"/>
-              <a:t>4/11/2022</a:t>
+              <a:t>2/20/23</a:t>
             </a:fld>
             <a:endParaRPr lang="en-US"/>
           </a:p>
@@ -2064,7 +2069,7 @@
           <a:p>
             <a:fld id="{F828D3D6-F492-446D-8F93-44886E91171F}" type="datetimeFigureOut">
               <a:rPr lang="en-US" smtClean="0"/>
-              <a:t>4/11/2022</a:t>
+              <a:t>2/20/23</a:t>
             </a:fld>
             <a:endParaRPr lang="en-US"/>
           </a:p>
@@ -2375,7 +2380,7 @@
           <a:p>
             <a:fld id="{F828D3D6-F492-446D-8F93-44886E91171F}" type="datetimeFigureOut">
               <a:rPr lang="en-US" smtClean="0"/>
-              <a:t>4/11/2022</a:t>
+              <a:t>2/20/23</a:t>
             </a:fld>
             <a:endParaRPr lang="en-US"/>
           </a:p>
@@ -2663,7 +2668,7 @@
           <a:p>
             <a:fld id="{F828D3D6-F492-446D-8F93-44886E91171F}" type="datetimeFigureOut">
               <a:rPr lang="en-US" smtClean="0"/>
-              <a:t>4/11/2022</a:t>
+              <a:t>2/20/23</a:t>
             </a:fld>
             <a:endParaRPr lang="en-US"/>
           </a:p>
@@ -2904,7 +2909,7 @@
           <a:p>
             <a:fld id="{F828D3D6-F492-446D-8F93-44886E91171F}" type="datetimeFigureOut">
               <a:rPr lang="en-US" smtClean="0"/>
-              <a:t>4/11/2022</a:t>
+              <a:t>2/20/23</a:t>
             </a:fld>
             <a:endParaRPr lang="en-US"/>
           </a:p>
@@ -3342,7 +3347,27 @@
           <a:bodyPr/>
           <a:lstStyle/>
           <a:p>
-            <a:endParaRPr lang="en-US"/>
+            <a:r>
+              <a:rPr lang="en-US" altLang="zh-CN" dirty="0"/>
+              <a:t>Sample</a:t>
+            </a:r>
+            <a:r>
+              <a:rPr lang="zh-CN" altLang="en-US" dirty="0"/>
+              <a:t> </a:t>
+            </a:r>
+            <a:r>
+              <a:rPr lang="en-US" altLang="zh-CN" dirty="0"/>
+              <a:t>–</a:t>
+            </a:r>
+            <a:r>
+              <a:rPr lang="zh-CN" altLang="en-US" dirty="0"/>
+              <a:t> </a:t>
+            </a:r>
+            <a:r>
+              <a:rPr lang="en-US" altLang="zh-CN" dirty="0"/>
+              <a:t>[[title]]</a:t>
+            </a:r>
+            <a:endParaRPr lang="en-US" dirty="0"/>
           </a:p>
         </p:txBody>
       </p:sp>
@@ -3367,10 +3392,89 @@
           <a:bodyPr/>
           <a:lstStyle/>
           <a:p>
-            <a:endParaRPr lang="en-US"/>
-          </a:p>
-        </p:txBody>
-      </p:sp>
+            <a:r>
+              <a:rPr lang="en-US" altLang="zh-CN" dirty="0"/>
+              <a:t>[[author]]</a:t>
+            </a:r>
+            <a:endParaRPr lang="en-US" dirty="0"/>
+          </a:p>
+        </p:txBody>
+      </p:sp>
+      <p:sp>
+        <p:nvSpPr>
+          <p:cNvPr id="4" name="TextBox 3">
+            <a:extLst>
+              <a:ext uri="{FF2B5EF4-FFF2-40B4-BE49-F238E27FC236}">
+                <a16:creationId xmlns:a16="http://schemas.microsoft.com/office/drawing/2014/main" id="{6A2CB492-72A2-1A22-9E00-B22B0009D2B3}"/>
+              </a:ext>
+            </a:extLst>
+          </p:cNvPr>
+          <p:cNvSpPr txBox="1"/>
+          <p:nvPr/>
+        </p:nvSpPr>
+        <p:spPr>
+          <a:xfrm>
+            <a:off x="3856383" y="487017"/>
+            <a:ext cx="1077924" cy="369332"/>
+          </a:xfrm>
+          <a:prstGeom prst="rect">
+            <a:avLst/>
+          </a:prstGeom>
+          <a:noFill/>
+        </p:spPr>
+        <p:txBody>
+          <a:bodyPr wrap="none" rtlCol="0">
+            <a:spAutoFit/>
+          </a:bodyPr>
+          <a:lstStyle/>
+          <a:p>
+            <a:r>
+              <a:rPr lang="en-US" altLang="zh-CN" dirty="0"/>
+              <a:t>[[VAR_1]]</a:t>
+            </a:r>
+            <a:endParaRPr lang="en-CN" dirty="0"/>
+          </a:p>
+        </p:txBody>
+      </p:sp>
+      <p:pic>
+        <p:nvPicPr>
+          <p:cNvPr id="6" name="Picture 5" descr="A pair of apples on a table&#10;&#10;Description automatically generated with medium confidence">
+            <a:extLst>
+              <a:ext uri="{FF2B5EF4-FFF2-40B4-BE49-F238E27FC236}">
+                <a16:creationId xmlns:a16="http://schemas.microsoft.com/office/drawing/2014/main" id="{A26339B1-7B97-2CF9-A9E8-71C4E8D7958B}"/>
+              </a:ext>
+            </a:extLst>
+          </p:cNvPr>
+          <p:cNvPicPr>
+            <a:picLocks noChangeAspect="1"/>
+          </p:cNvPicPr>
+          <p:nvPr/>
+        </p:nvPicPr>
+        <p:blipFill>
+          <a:blip r:embed="rId2">
+            <a:extLst>
+              <a:ext uri="{28A0092B-C50C-407E-A947-70E740481C1C}">
+                <a14:useLocalDpi xmlns:a14="http://schemas.microsoft.com/office/drawing/2010/main" val="0"/>
+              </a:ext>
+              <a:ext uri="{837473B0-CC2E-450A-ABE3-18F120FF3D39}">
+                <a1611:picAttrSrcUrl xmlns:a1611="http://schemas.microsoft.com/office/drawing/2016/11/main" r:id="rId3"/>
+              </a:ext>
+            </a:extLst>
+          </a:blip>
+          <a:stretch>
+            <a:fillRect/>
+          </a:stretch>
+        </p:blipFill>
+        <p:spPr>
+          <a:xfrm>
+            <a:off x="4395345" y="4250317"/>
+            <a:ext cx="3786800" cy="2522673"/>
+          </a:xfrm>
+          <a:prstGeom prst="rect">
+            <a:avLst/>
+          </a:prstGeom>
+        </p:spPr>
+      </p:pic>
     </p:spTree>
     <p:extLst>
       <p:ext uri="{BB962C8B-B14F-4D97-AF65-F5344CB8AC3E}">

</xml_diff>